<commit_message>
added some slides to ppt for more clear interpretation
</commit_message>
<xml_diff>
--- a/Final Year Project(PPT)(Group- CS41).pptx
+++ b/Final Year Project(PPT)(Group- CS41).pptx
@@ -5,20 +5,21 @@
     <p:sldMasterId id="2147483659" r:id="rId1"/>
   </p:sldMasterIdLst>
   <p:notesMasterIdLst>
-    <p:notesMasterId r:id="rId13"/>
+    <p:notesMasterId r:id="rId14"/>
   </p:notesMasterIdLst>
   <p:sldIdLst>
     <p:sldId id="256" r:id="rId2"/>
     <p:sldId id="257" r:id="rId3"/>
     <p:sldId id="258" r:id="rId4"/>
-    <p:sldId id="262" r:id="rId5"/>
-    <p:sldId id="260" r:id="rId6"/>
-    <p:sldId id="269" r:id="rId7"/>
-    <p:sldId id="263" r:id="rId8"/>
-    <p:sldId id="264" r:id="rId9"/>
-    <p:sldId id="270" r:id="rId10"/>
-    <p:sldId id="265" r:id="rId11"/>
-    <p:sldId id="266" r:id="rId12"/>
+    <p:sldId id="271" r:id="rId5"/>
+    <p:sldId id="262" r:id="rId6"/>
+    <p:sldId id="260" r:id="rId7"/>
+    <p:sldId id="269" r:id="rId8"/>
+    <p:sldId id="263" r:id="rId9"/>
+    <p:sldId id="264" r:id="rId10"/>
+    <p:sldId id="270" r:id="rId11"/>
+    <p:sldId id="265" r:id="rId12"/>
+    <p:sldId id="266" r:id="rId13"/>
   </p:sldIdLst>
   <p:sldSz cx="9144000" cy="5143500" type="screen16x9"/>
   <p:notesSz cx="6858000" cy="9144000"/>
@@ -6610,7 +6611,10 @@
     <p:bg>
       <p:bgPr>
         <a:solidFill>
-          <a:srgbClr val="1155CC"/>
+          <a:schemeClr val="accent2">
+            <a:lumMod val="10000"/>
+            <a:lumOff val="90000"/>
+          </a:schemeClr>
         </a:solidFill>
         <a:effectLst/>
       </p:bgPr>
@@ -6670,14 +6674,18 @@
             <a:r>
               <a:rPr lang="en" sz="5000" dirty="0">
                 <a:solidFill>
-                  <a:srgbClr val="FFFFFF"/>
+                  <a:schemeClr val="accent5">
+                    <a:lumMod val="50000"/>
+                  </a:schemeClr>
                 </a:solidFill>
               </a:rPr>
               <a:t>Quantum safe algorithm</a:t>
             </a:r>
             <a:endParaRPr sz="5000" dirty="0">
               <a:solidFill>
-                <a:srgbClr val="FFFFFF"/>
+                <a:schemeClr val="accent5">
+                  <a:lumMod val="50000"/>
+                </a:schemeClr>
               </a:solidFill>
             </a:endParaRPr>
           </a:p>
@@ -6720,7 +6728,9 @@
             <a:r>
               <a:rPr lang="en-US" dirty="0">
                 <a:solidFill>
-                  <a:srgbClr val="FFFFFF"/>
+                  <a:schemeClr val="accent5">
+                    <a:lumMod val="50000"/>
+                  </a:schemeClr>
                 </a:solidFill>
               </a:rPr>
               <a:t>A variation based on Error correction codes and blowfish-styled symmetric cipher.</a:t>
@@ -6737,6 +6747,298 @@
 </file>
 
 <file path=ppt/slides/slide10.xml><?xml version="1.0" encoding="utf-8"?>
+<p:sld xmlns:a="http://schemas.openxmlformats.org/drawingml/2006/main" xmlns:r="http://schemas.openxmlformats.org/officeDocument/2006/relationships" xmlns:p="http://schemas.openxmlformats.org/presentationml/2006/main">
+  <p:cSld>
+    <p:bg>
+      <p:bgPr>
+        <a:solidFill>
+          <a:schemeClr val="tx2">
+            <a:lumMod val="90000"/>
+          </a:schemeClr>
+        </a:solidFill>
+        <a:effectLst/>
+      </p:bgPr>
+    </p:bg>
+    <p:spTree>
+      <p:nvGrpSpPr>
+        <p:cNvPr id="1" name="Shape 86"/>
+        <p:cNvGrpSpPr/>
+        <p:nvPr/>
+      </p:nvGrpSpPr>
+      <p:grpSpPr>
+        <a:xfrm>
+          <a:off x="0" y="0"/>
+          <a:ext cx="0" cy="0"/>
+          <a:chOff x="0" y="0"/>
+          <a:chExt cx="0" cy="0"/>
+        </a:xfrm>
+      </p:grpSpPr>
+      <p:sp>
+        <p:nvSpPr>
+          <p:cNvPr id="87" name="Google Shape;87;p14"/>
+          <p:cNvSpPr txBox="1"/>
+          <p:nvPr/>
+        </p:nvSpPr>
+        <p:spPr>
+          <a:xfrm>
+            <a:off x="150025" y="139300"/>
+            <a:ext cx="5357700" cy="400200"/>
+          </a:xfrm>
+          <a:prstGeom prst="rect">
+            <a:avLst/>
+          </a:prstGeom>
+          <a:noFill/>
+          <a:ln>
+            <a:noFill/>
+          </a:ln>
+        </p:spPr>
+        <p:txBody>
+          <a:bodyPr spcFirstLastPara="1" wrap="square" lIns="91425" tIns="91425" rIns="91425" bIns="91425" anchor="t" anchorCtr="0">
+            <a:spAutoFit/>
+          </a:bodyPr>
+          <a:lstStyle/>
+          <a:p>
+            <a:pPr marL="0" lvl="0" indent="0" algn="l" rtl="0">
+              <a:spcBef>
+                <a:spcPts val="0"/>
+              </a:spcBef>
+              <a:spcAft>
+                <a:spcPts val="0"/>
+              </a:spcAft>
+              <a:buNone/>
+            </a:pPr>
+            <a:r>
+              <a:rPr lang="en" u="sng"/>
+              <a:t>The methodology of the Error correcting codes:</a:t>
+            </a:r>
+            <a:endParaRPr u="sng"/>
+          </a:p>
+        </p:txBody>
+      </p:sp>
+      <p:sp>
+        <p:nvSpPr>
+          <p:cNvPr id="88" name="Google Shape;88;p14"/>
+          <p:cNvSpPr txBox="1"/>
+          <p:nvPr/>
+        </p:nvSpPr>
+        <p:spPr>
+          <a:xfrm>
+            <a:off x="267900" y="610800"/>
+            <a:ext cx="8679600" cy="2770500"/>
+          </a:xfrm>
+          <a:prstGeom prst="rect">
+            <a:avLst/>
+          </a:prstGeom>
+          <a:noFill/>
+          <a:ln>
+            <a:noFill/>
+          </a:ln>
+        </p:spPr>
+        <p:txBody>
+          <a:bodyPr spcFirstLastPara="1" wrap="square" lIns="91425" tIns="91425" rIns="91425" bIns="91425" anchor="t" anchorCtr="0">
+            <a:spAutoFit/>
+          </a:bodyPr>
+          <a:lstStyle/>
+          <a:p>
+            <a:pPr marL="0" lvl="0" indent="0" algn="l" rtl="0">
+              <a:spcBef>
+                <a:spcPts val="0"/>
+              </a:spcBef>
+              <a:spcAft>
+                <a:spcPts val="0"/>
+              </a:spcAft>
+              <a:buNone/>
+            </a:pPr>
+            <a:r>
+              <a:rPr lang="en"/>
+              <a:t>Let us suppose that we want to transmit a 3 bit data: “010”, but instead of sending this as it is, </a:t>
+            </a:r>
+            <a:endParaRPr/>
+          </a:p>
+          <a:p>
+            <a:pPr marL="0" lvl="0" indent="0" algn="l" rtl="0">
+              <a:spcBef>
+                <a:spcPts val="0"/>
+              </a:spcBef>
+              <a:spcAft>
+                <a:spcPts val="0"/>
+              </a:spcAft>
+              <a:buNone/>
+            </a:pPr>
+            <a:r>
+              <a:rPr lang="en"/>
+              <a:t>I will send “000 111 000” instead , such that if in future it gets polluted to be something like “010 110 001” , then we can retrieve the original data by taking maximum occurring bit from each of the chunk of the three.</a:t>
+            </a:r>
+            <a:endParaRPr/>
+          </a:p>
+          <a:p>
+            <a:pPr marL="0" lvl="0" indent="0" algn="l" rtl="0">
+              <a:spcBef>
+                <a:spcPts val="0"/>
+              </a:spcBef>
+              <a:spcAft>
+                <a:spcPts val="0"/>
+              </a:spcAft>
+              <a:buNone/>
+            </a:pPr>
+            <a:endParaRPr/>
+          </a:p>
+          <a:p>
+            <a:pPr marL="0" lvl="0" indent="0" algn="l" rtl="0">
+              <a:spcBef>
+                <a:spcPts val="0"/>
+              </a:spcBef>
+              <a:spcAft>
+                <a:spcPts val="0"/>
+              </a:spcAft>
+              <a:buNone/>
+            </a:pPr>
+            <a:r>
+              <a:rPr lang="en"/>
+              <a:t>Now we learn that if we have a bit pattern of length of “N” then we can convert it into a corresponding sequence of length of “M” such that M=cN, which will make the process of correction easier only on encryption and decryption side but the transmitted data will not be the same plaintext.</a:t>
+            </a:r>
+            <a:endParaRPr/>
+          </a:p>
+          <a:p>
+            <a:pPr marL="0" lvl="0" indent="0" algn="l" rtl="0">
+              <a:spcBef>
+                <a:spcPts val="0"/>
+              </a:spcBef>
+              <a:spcAft>
+                <a:spcPts val="0"/>
+              </a:spcAft>
+              <a:buNone/>
+            </a:pPr>
+            <a:endParaRPr/>
+          </a:p>
+          <a:p>
+            <a:pPr marL="0" lvl="0" indent="0" algn="l" rtl="0">
+              <a:spcBef>
+                <a:spcPts val="0"/>
+              </a:spcBef>
+              <a:spcAft>
+                <a:spcPts val="0"/>
+              </a:spcAft>
+              <a:buNone/>
+            </a:pPr>
+            <a:endParaRPr/>
+          </a:p>
+          <a:p>
+            <a:pPr marL="0" lvl="0" indent="0" algn="l" rtl="0">
+              <a:spcBef>
+                <a:spcPts val="0"/>
+              </a:spcBef>
+              <a:spcAft>
+                <a:spcPts val="0"/>
+              </a:spcAft>
+              <a:buNone/>
+            </a:pPr>
+            <a:r>
+              <a:rPr lang="en"/>
+              <a:t>Finally we have sequence to be sent as : “001”</a:t>
+            </a:r>
+            <a:br>
+              <a:rPr lang="en"/>
+            </a:br>
+            <a:r>
+              <a:rPr lang="en"/>
+              <a:t>I can convert them into either “000 000 111” or “010 001 110”, because both of them will be producing the same pattern when we will run selection based on majority of frequency.</a:t>
+            </a:r>
+            <a:endParaRPr/>
+          </a:p>
+        </p:txBody>
+      </p:sp>
+      <p:sp>
+        <p:nvSpPr>
+          <p:cNvPr id="89" name="Google Shape;89;p14"/>
+          <p:cNvSpPr txBox="1"/>
+          <p:nvPr/>
+        </p:nvSpPr>
+        <p:spPr>
+          <a:xfrm>
+            <a:off x="364325" y="3568300"/>
+            <a:ext cx="8390400" cy="1046700"/>
+          </a:xfrm>
+          <a:prstGeom prst="rect">
+            <a:avLst/>
+          </a:prstGeom>
+          <a:noFill/>
+          <a:ln>
+            <a:noFill/>
+          </a:ln>
+        </p:spPr>
+        <p:txBody>
+          <a:bodyPr spcFirstLastPara="1" wrap="square" lIns="91425" tIns="91425" rIns="91425" bIns="91425" anchor="t" anchorCtr="0">
+            <a:spAutoFit/>
+          </a:bodyPr>
+          <a:lstStyle/>
+          <a:p>
+            <a:pPr marL="0" lvl="0" indent="0" algn="l" rtl="0">
+              <a:spcBef>
+                <a:spcPts val="0"/>
+              </a:spcBef>
+              <a:spcAft>
+                <a:spcPts val="0"/>
+              </a:spcAft>
+              <a:buNone/>
+            </a:pPr>
+            <a:r>
+              <a:rPr lang="en"/>
+              <a:t>SO, we have used the </a:t>
+            </a:r>
+            <a:r>
+              <a:rPr lang="en">
+                <a:solidFill>
+                  <a:srgbClr val="980000"/>
+                </a:solidFill>
+              </a:rPr>
+              <a:t>Maximum Distance Separable(MDS)</a:t>
+            </a:r>
+            <a:r>
+              <a:rPr lang="en"/>
+              <a:t> </a:t>
+            </a:r>
+            <a:r>
+              <a:rPr lang="en">
+                <a:solidFill>
+                  <a:srgbClr val="980000"/>
+                </a:solidFill>
+              </a:rPr>
+              <a:t>matrix for modifying the original plaintext to new plaintext which will go for the further encryption process by linear transformation.</a:t>
+            </a:r>
+            <a:endParaRPr>
+              <a:solidFill>
+                <a:srgbClr val="980000"/>
+              </a:solidFill>
+            </a:endParaRPr>
+          </a:p>
+          <a:p>
+            <a:pPr marL="0" lvl="0" indent="0" algn="l" rtl="0">
+              <a:spcBef>
+                <a:spcPts val="0"/>
+              </a:spcBef>
+              <a:spcAft>
+                <a:spcPts val="0"/>
+              </a:spcAft>
+              <a:buNone/>
+            </a:pPr>
+            <a:r>
+              <a:rPr lang="en"/>
+              <a:t>MDS will corrupt the text but will keep the original information safe as the process of the maximum frequency method can extract the codes after the decryption process.</a:t>
+            </a:r>
+            <a:endParaRPr/>
+          </a:p>
+        </p:txBody>
+      </p:sp>
+    </p:spTree>
+  </p:cSld>
+  <p:clrMapOvr>
+    <a:masterClrMapping/>
+  </p:clrMapOvr>
+</p:sld>
+</file>
+
+<file path=ppt/slides/slide11.xml><?xml version="1.0" encoding="utf-8"?>
 <p:sld xmlns:a="http://schemas.openxmlformats.org/drawingml/2006/main" xmlns:r="http://schemas.openxmlformats.org/officeDocument/2006/relationships" xmlns:p="http://schemas.openxmlformats.org/presentationml/2006/main">
   <p:cSld>
     <p:bg>
@@ -7709,7 +8011,7 @@
 </p:sld>
 </file>
 
-<file path=ppt/slides/slide11.xml><?xml version="1.0" encoding="utf-8"?>
+<file path=ppt/slides/slide12.xml><?xml version="1.0" encoding="utf-8"?>
 <p:sld xmlns:a="http://schemas.openxmlformats.org/drawingml/2006/main" xmlns:r="http://schemas.openxmlformats.org/officeDocument/2006/relationships" xmlns:p="http://schemas.openxmlformats.org/presentationml/2006/main">
   <p:cSld>
     <p:bg>
@@ -7776,8 +8078,9 @@
     <p:bg>
       <p:bgPr>
         <a:solidFill>
-          <a:schemeClr val="tx2">
-            <a:lumMod val="50000"/>
+          <a:schemeClr val="accent3">
+            <a:lumMod val="20000"/>
+            <a:lumOff val="80000"/>
           </a:schemeClr>
         </a:solidFill>
         <a:effectLst/>
@@ -7834,16 +8137,20 @@
             <a:r>
               <a:rPr lang="en" dirty="0">
                 <a:solidFill>
-                  <a:srgbClr val="FFFFFF"/>
+                  <a:schemeClr val="accent5">
+                    <a:lumMod val="50000"/>
+                  </a:schemeClr>
                 </a:solidFill>
               </a:rPr>
-              <a:t>Characteristics of BlowFish family</a:t>
+              <a:t>Characteristics of BlowFish family </a:t>
             </a:r>
-            <a:r>
-              <a:rPr lang="en" dirty="0"/>
-              <a:t> </a:t>
-            </a:r>
-            <a:endParaRPr dirty="0"/>
+            <a:endParaRPr dirty="0">
+              <a:solidFill>
+                <a:schemeClr val="accent5">
+                  <a:lumMod val="50000"/>
+                </a:schemeClr>
+              </a:solidFill>
+            </a:endParaRPr>
           </a:p>
         </p:txBody>
       </p:sp>
@@ -8098,8 +8405,9 @@
     <p:bg>
       <p:bgPr>
         <a:solidFill>
-          <a:schemeClr val="tx2">
-            <a:lumMod val="50000"/>
+          <a:schemeClr val="accent3">
+            <a:lumMod val="20000"/>
+            <a:lumOff val="80000"/>
           </a:schemeClr>
         </a:solidFill>
         <a:effectLst/>
@@ -8358,7 +8666,7 @@
         </p:nvSpPr>
         <p:spPr>
           <a:xfrm>
-            <a:off x="996600" y="760800"/>
+            <a:off x="1093100" y="884188"/>
             <a:ext cx="1660800" cy="332100"/>
           </a:xfrm>
           <a:prstGeom prst="rect">
@@ -8387,14 +8695,18 @@
             <a:r>
               <a:rPr lang="en" dirty="0">
                 <a:solidFill>
-                  <a:schemeClr val="bg1"/>
+                  <a:schemeClr val="accent5">
+                    <a:lumMod val="50000"/>
+                  </a:schemeClr>
                 </a:solidFill>
               </a:rPr>
               <a:t>KEY</a:t>
             </a:r>
             <a:endParaRPr dirty="0">
               <a:solidFill>
-                <a:schemeClr val="bg1"/>
+                <a:schemeClr val="accent5">
+                  <a:lumMod val="50000"/>
+                </a:schemeClr>
               </a:solidFill>
             </a:endParaRPr>
           </a:p>
@@ -8437,14 +8749,18 @@
             <a:r>
               <a:rPr lang="en" dirty="0">
                 <a:solidFill>
-                  <a:schemeClr val="bg1"/>
+                  <a:schemeClr val="accent5">
+                    <a:lumMod val="50000"/>
+                  </a:schemeClr>
                 </a:solidFill>
               </a:rPr>
               <a:t>Ciphertext</a:t>
             </a:r>
             <a:endParaRPr dirty="0">
               <a:solidFill>
-                <a:schemeClr val="bg1"/>
+                <a:schemeClr val="accent5">
+                  <a:lumMod val="50000"/>
+                </a:schemeClr>
               </a:solidFill>
             </a:endParaRPr>
           </a:p>
@@ -8458,7 +8774,7 @@
         </p:nvSpPr>
         <p:spPr>
           <a:xfrm>
-            <a:off x="943000" y="2014525"/>
+            <a:off x="1012600" y="1800200"/>
             <a:ext cx="1157400" cy="267900"/>
           </a:xfrm>
           <a:prstGeom prst="rect">
@@ -8487,14 +8803,18 @@
             <a:r>
               <a:rPr lang="en" dirty="0">
                 <a:solidFill>
-                  <a:schemeClr val="bg1"/>
+                  <a:schemeClr val="accent5">
+                    <a:lumMod val="50000"/>
+                  </a:schemeClr>
                 </a:solidFill>
               </a:rPr>
               <a:t>PlainText</a:t>
             </a:r>
             <a:endParaRPr dirty="0">
               <a:solidFill>
-                <a:schemeClr val="bg1"/>
+                <a:schemeClr val="accent5">
+                  <a:lumMod val="50000"/>
+                </a:schemeClr>
               </a:solidFill>
             </a:endParaRPr>
           </a:p>
@@ -8508,7 +8828,7 @@
         </p:nvSpPr>
         <p:spPr>
           <a:xfrm>
-            <a:off x="3246875" y="1114425"/>
+            <a:off x="3270937" y="1114437"/>
             <a:ext cx="1452000" cy="717900"/>
           </a:xfrm>
           <a:prstGeom prst="rect">
@@ -8535,10 +8855,22 @@
               <a:buNone/>
             </a:pPr>
             <a:r>
-              <a:rPr lang="en" dirty="0"/>
+              <a:rPr lang="en" dirty="0">
+                <a:solidFill>
+                  <a:schemeClr val="accent5">
+                    <a:lumMod val="50000"/>
+                  </a:schemeClr>
+                </a:solidFill>
+              </a:rPr>
               <a:t>BLOWFISH FAMILY</a:t>
             </a:r>
-            <a:endParaRPr dirty="0"/>
+            <a:endParaRPr dirty="0">
+              <a:solidFill>
+                <a:schemeClr val="accent5">
+                  <a:lumMod val="50000"/>
+                </a:schemeClr>
+              </a:solidFill>
+            </a:endParaRPr>
           </a:p>
         </p:txBody>
       </p:sp>
@@ -8579,14 +8911,18 @@
             <a:r>
               <a:rPr lang="en" b="1" dirty="0">
                 <a:solidFill>
-                  <a:schemeClr val="bg1"/>
+                  <a:schemeClr val="accent5">
+                    <a:lumMod val="50000"/>
+                  </a:schemeClr>
                 </a:solidFill>
               </a:rPr>
               <a:t>1.Confusion - There should be minimal obvious relationship between plaintext,key and cipher</a:t>
             </a:r>
             <a:endParaRPr b="1" dirty="0">
               <a:solidFill>
-                <a:schemeClr val="bg1"/>
+                <a:schemeClr val="accent5">
+                  <a:lumMod val="50000"/>
+                </a:schemeClr>
               </a:solidFill>
             </a:endParaRPr>
           </a:p>
@@ -8603,14 +8939,18 @@
             <a:r>
               <a:rPr lang="en" b="1" dirty="0">
                 <a:solidFill>
-                  <a:schemeClr val="bg1"/>
+                  <a:schemeClr val="accent5">
+                    <a:lumMod val="50000"/>
+                  </a:schemeClr>
                 </a:solidFill>
               </a:rPr>
               <a:t>2. Diffusion -  Every bit of cipher should depend on every bit of plaintext and every bit of the key</a:t>
             </a:r>
             <a:endParaRPr b="1" dirty="0">
               <a:solidFill>
-                <a:schemeClr val="bg1"/>
+                <a:schemeClr val="accent5">
+                  <a:lumMod val="50000"/>
+                </a:schemeClr>
               </a:solidFill>
             </a:endParaRPr>
           </a:p>
@@ -8626,7 +8966,9 @@
             </a:pPr>
             <a:endParaRPr b="1" dirty="0">
               <a:solidFill>
-                <a:schemeClr val="bg1"/>
+                <a:schemeClr val="accent5">
+                  <a:lumMod val="50000"/>
+                </a:schemeClr>
               </a:solidFill>
             </a:endParaRPr>
           </a:p>
@@ -8643,14 +8985,18 @@
             <a:r>
               <a:rPr lang="en" b="1" dirty="0">
                 <a:solidFill>
-                  <a:schemeClr val="bg1"/>
+                  <a:schemeClr val="accent5">
+                    <a:lumMod val="50000"/>
+                  </a:schemeClr>
                 </a:solidFill>
               </a:rPr>
               <a:t>These two concepts and independence of feistel architecture from the round function makes basis of our algorithm. The “keys” and matrices are inspired from the ongoing research in coding theory.</a:t>
             </a:r>
             <a:endParaRPr b="1" dirty="0">
               <a:solidFill>
-                <a:schemeClr val="bg1"/>
+                <a:schemeClr val="accent5">
+                  <a:lumMod val="50000"/>
+                </a:schemeClr>
               </a:solidFill>
             </a:endParaRPr>
           </a:p>
@@ -8667,11 +9013,762 @@
 <file path=ppt/slides/slide4.xml><?xml version="1.0" encoding="utf-8"?>
 <p:sld xmlns:a="http://schemas.openxmlformats.org/drawingml/2006/main" xmlns:r="http://schemas.openxmlformats.org/officeDocument/2006/relationships" xmlns:p="http://schemas.openxmlformats.org/presentationml/2006/main">
   <p:cSld>
+    <p:spTree>
+      <p:nvGrpSpPr>
+        <p:cNvPr id="1" name=""/>
+        <p:cNvGrpSpPr/>
+        <p:nvPr/>
+      </p:nvGrpSpPr>
+      <p:grpSpPr>
+        <a:xfrm>
+          <a:off x="0" y="0"/>
+          <a:ext cx="0" cy="0"/>
+          <a:chOff x="0" y="0"/>
+          <a:chExt cx="0" cy="0"/>
+        </a:xfrm>
+      </p:grpSpPr>
+      <p:sp>
+        <p:nvSpPr>
+          <p:cNvPr id="10" name="Rectangle 9">
+            <a:extLst>
+              <a:ext uri="{FF2B5EF4-FFF2-40B4-BE49-F238E27FC236}">
+                <a16:creationId xmlns:a16="http://schemas.microsoft.com/office/drawing/2014/main" id="{27B16428-F38E-44FB-9809-FDA280A4FFBB}"/>
+              </a:ext>
+            </a:extLst>
+          </p:cNvPr>
+          <p:cNvSpPr/>
+          <p:nvPr/>
+        </p:nvSpPr>
+        <p:spPr>
+          <a:xfrm>
+            <a:off x="214704" y="2987926"/>
+            <a:ext cx="5235678" cy="877529"/>
+          </a:xfrm>
+          <a:prstGeom prst="rect">
+            <a:avLst/>
+          </a:prstGeom>
+          <a:solidFill>
+            <a:schemeClr val="tx2">
+              <a:lumMod val="90000"/>
+            </a:schemeClr>
+          </a:solidFill>
+        </p:spPr>
+        <p:style>
+          <a:lnRef idx="2">
+            <a:schemeClr val="accent1">
+              <a:shade val="50000"/>
+            </a:schemeClr>
+          </a:lnRef>
+          <a:fillRef idx="1">
+            <a:schemeClr val="accent1"/>
+          </a:fillRef>
+          <a:effectRef idx="0">
+            <a:schemeClr val="accent1"/>
+          </a:effectRef>
+          <a:fontRef idx="minor">
+            <a:schemeClr val="lt1"/>
+          </a:fontRef>
+        </p:style>
+        <p:txBody>
+          <a:bodyPr rtlCol="0" anchor="ctr"/>
+          <a:lstStyle/>
+          <a:p>
+            <a:pPr algn="ctr"/>
+            <a:endParaRPr lang="en-IN"/>
+          </a:p>
+        </p:txBody>
+      </p:sp>
+      <p:sp>
+        <p:nvSpPr>
+          <p:cNvPr id="2" name="TextBox 1">
+            <a:extLst>
+              <a:ext uri="{FF2B5EF4-FFF2-40B4-BE49-F238E27FC236}">
+                <a16:creationId xmlns:a16="http://schemas.microsoft.com/office/drawing/2014/main" id="{F5BA9F75-D0BF-48D1-9EDE-347FFBAC1378}"/>
+              </a:ext>
+            </a:extLst>
+          </p:cNvPr>
+          <p:cNvSpPr txBox="1"/>
+          <p:nvPr/>
+        </p:nvSpPr>
+        <p:spPr>
+          <a:xfrm>
+            <a:off x="131090" y="2632667"/>
+            <a:ext cx="4962832" cy="307777"/>
+          </a:xfrm>
+          <a:prstGeom prst="rect">
+            <a:avLst/>
+          </a:prstGeom>
+          <a:noFill/>
+        </p:spPr>
+        <p:txBody>
+          <a:bodyPr wrap="square" rtlCol="0">
+            <a:spAutoFit/>
+          </a:bodyPr>
+          <a:lstStyle/>
+          <a:p>
+            <a:r>
+              <a:rPr lang="en-US" u="sng" dirty="0">
+                <a:solidFill>
+                  <a:schemeClr val="accent5">
+                    <a:lumMod val="75000"/>
+                  </a:schemeClr>
+                </a:solidFill>
+              </a:rPr>
+              <a:t>Adding proper padding in plaintext for verification :</a:t>
+            </a:r>
+            <a:endParaRPr lang="en-IN" u="sng" dirty="0">
+              <a:solidFill>
+                <a:schemeClr val="accent5">
+                  <a:lumMod val="75000"/>
+                </a:schemeClr>
+              </a:solidFill>
+            </a:endParaRPr>
+          </a:p>
+        </p:txBody>
+      </p:sp>
+      <p:sp>
+        <p:nvSpPr>
+          <p:cNvPr id="3" name="Rectangle: Rounded Corners 2">
+            <a:extLst>
+              <a:ext uri="{FF2B5EF4-FFF2-40B4-BE49-F238E27FC236}">
+                <a16:creationId xmlns:a16="http://schemas.microsoft.com/office/drawing/2014/main" id="{5D3AEB8E-9CEE-488F-8E76-91DDCFAE55EB}"/>
+              </a:ext>
+            </a:extLst>
+          </p:cNvPr>
+          <p:cNvSpPr/>
+          <p:nvPr/>
+        </p:nvSpPr>
+        <p:spPr>
+          <a:xfrm>
+            <a:off x="443304" y="3209151"/>
+            <a:ext cx="3082413" cy="383459"/>
+          </a:xfrm>
+          <a:prstGeom prst="roundRect">
+            <a:avLst/>
+          </a:prstGeom>
+        </p:spPr>
+        <p:style>
+          <a:lnRef idx="2">
+            <a:schemeClr val="accent1">
+              <a:shade val="50000"/>
+            </a:schemeClr>
+          </a:lnRef>
+          <a:fillRef idx="1">
+            <a:schemeClr val="accent1"/>
+          </a:fillRef>
+          <a:effectRef idx="0">
+            <a:schemeClr val="accent1"/>
+          </a:effectRef>
+          <a:fontRef idx="minor">
+            <a:schemeClr val="lt1"/>
+          </a:fontRef>
+        </p:style>
+        <p:txBody>
+          <a:bodyPr rtlCol="0" anchor="ctr"/>
+          <a:lstStyle/>
+          <a:p>
+            <a:pPr algn="ctr"/>
+            <a:r>
+              <a:rPr lang="en-US" sz="1100" dirty="0">
+                <a:solidFill>
+                  <a:schemeClr val="tx1"/>
+                </a:solidFill>
+              </a:rPr>
+              <a:t>Encoded plaintext where size modulo 128 is not zero</a:t>
+            </a:r>
+            <a:endParaRPr lang="en-IN" sz="1100" dirty="0">
+              <a:solidFill>
+                <a:schemeClr val="tx1"/>
+              </a:solidFill>
+            </a:endParaRPr>
+          </a:p>
+        </p:txBody>
+      </p:sp>
+      <p:sp>
+        <p:nvSpPr>
+          <p:cNvPr id="5" name="Rectangle: Rounded Corners 4">
+            <a:extLst>
+              <a:ext uri="{FF2B5EF4-FFF2-40B4-BE49-F238E27FC236}">
+                <a16:creationId xmlns:a16="http://schemas.microsoft.com/office/drawing/2014/main" id="{36B9E68A-EF93-402C-AFD6-DD06A082F972}"/>
+              </a:ext>
+            </a:extLst>
+          </p:cNvPr>
+          <p:cNvSpPr/>
+          <p:nvPr/>
+        </p:nvSpPr>
+        <p:spPr>
+          <a:xfrm>
+            <a:off x="3525717" y="3209151"/>
+            <a:ext cx="1327355" cy="383459"/>
+          </a:xfrm>
+          <a:prstGeom prst="roundRect">
+            <a:avLst/>
+          </a:prstGeom>
+        </p:spPr>
+        <p:style>
+          <a:lnRef idx="2">
+            <a:schemeClr val="accent5">
+              <a:shade val="50000"/>
+            </a:schemeClr>
+          </a:lnRef>
+          <a:fillRef idx="1">
+            <a:schemeClr val="accent5"/>
+          </a:fillRef>
+          <a:effectRef idx="0">
+            <a:schemeClr val="accent5"/>
+          </a:effectRef>
+          <a:fontRef idx="minor">
+            <a:schemeClr val="lt1"/>
+          </a:fontRef>
+        </p:style>
+        <p:txBody>
+          <a:bodyPr rtlCol="0" anchor="ctr"/>
+          <a:lstStyle/>
+          <a:p>
+            <a:pPr algn="ctr"/>
+            <a:r>
+              <a:rPr lang="en-US" b="1" dirty="0"/>
+              <a:t>Padding</a:t>
+            </a:r>
+            <a:endParaRPr lang="en-IN" b="1" dirty="0"/>
+          </a:p>
+        </p:txBody>
+      </p:sp>
+      <p:sp>
+        <p:nvSpPr>
+          <p:cNvPr id="6" name="Arrow: Right 5">
+            <a:extLst>
+              <a:ext uri="{FF2B5EF4-FFF2-40B4-BE49-F238E27FC236}">
+                <a16:creationId xmlns:a16="http://schemas.microsoft.com/office/drawing/2014/main" id="{32311289-2434-4FBD-A9DD-93FADB0A777F}"/>
+              </a:ext>
+            </a:extLst>
+          </p:cNvPr>
+          <p:cNvSpPr/>
+          <p:nvPr/>
+        </p:nvSpPr>
+        <p:spPr>
+          <a:xfrm rot="16200000">
+            <a:off x="3662140" y="4092693"/>
+            <a:ext cx="1054510" cy="153893"/>
+          </a:xfrm>
+          <a:prstGeom prst="rightArrow">
+            <a:avLst/>
+          </a:prstGeom>
+          <a:ln>
+            <a:solidFill>
+              <a:schemeClr val="accent5">
+                <a:lumMod val="75000"/>
+              </a:schemeClr>
+            </a:solidFill>
+          </a:ln>
+        </p:spPr>
+        <p:style>
+          <a:lnRef idx="2">
+            <a:schemeClr val="accent1">
+              <a:shade val="50000"/>
+            </a:schemeClr>
+          </a:lnRef>
+          <a:fillRef idx="1">
+            <a:schemeClr val="accent1"/>
+          </a:fillRef>
+          <a:effectRef idx="0">
+            <a:schemeClr val="accent1"/>
+          </a:effectRef>
+          <a:fontRef idx="minor">
+            <a:schemeClr val="lt1"/>
+          </a:fontRef>
+        </p:style>
+        <p:txBody>
+          <a:bodyPr rtlCol="0" anchor="ctr"/>
+          <a:lstStyle/>
+          <a:p>
+            <a:pPr algn="ctr"/>
+            <a:endParaRPr lang="en-IN"/>
+          </a:p>
+        </p:txBody>
+      </p:sp>
+      <p:sp>
+        <p:nvSpPr>
+          <p:cNvPr id="7" name="Arrow: Right 6">
+            <a:extLst>
+              <a:ext uri="{FF2B5EF4-FFF2-40B4-BE49-F238E27FC236}">
+                <a16:creationId xmlns:a16="http://schemas.microsoft.com/office/drawing/2014/main" id="{75F6A77B-710E-4DC9-9DD5-582DF2B31FEB}"/>
+              </a:ext>
+            </a:extLst>
+          </p:cNvPr>
+          <p:cNvSpPr/>
+          <p:nvPr/>
+        </p:nvSpPr>
+        <p:spPr>
+          <a:xfrm rot="16200000">
+            <a:off x="1091005" y="4092693"/>
+            <a:ext cx="1054510" cy="153893"/>
+          </a:xfrm>
+          <a:prstGeom prst="rightArrow">
+            <a:avLst/>
+          </a:prstGeom>
+          <a:ln>
+            <a:solidFill>
+              <a:schemeClr val="accent5">
+                <a:lumMod val="75000"/>
+              </a:schemeClr>
+            </a:solidFill>
+          </a:ln>
+        </p:spPr>
+        <p:style>
+          <a:lnRef idx="2">
+            <a:schemeClr val="accent1">
+              <a:shade val="50000"/>
+            </a:schemeClr>
+          </a:lnRef>
+          <a:fillRef idx="1">
+            <a:schemeClr val="accent1"/>
+          </a:fillRef>
+          <a:effectRef idx="0">
+            <a:schemeClr val="accent1"/>
+          </a:effectRef>
+          <a:fontRef idx="minor">
+            <a:schemeClr val="lt1"/>
+          </a:fontRef>
+        </p:style>
+        <p:txBody>
+          <a:bodyPr rtlCol="0" anchor="ctr"/>
+          <a:lstStyle/>
+          <a:p>
+            <a:pPr algn="ctr"/>
+            <a:endParaRPr lang="en-IN"/>
+          </a:p>
+        </p:txBody>
+      </p:sp>
+      <p:sp>
+        <p:nvSpPr>
+          <p:cNvPr id="8" name="TextBox 7">
+            <a:extLst>
+              <a:ext uri="{FF2B5EF4-FFF2-40B4-BE49-F238E27FC236}">
+                <a16:creationId xmlns:a16="http://schemas.microsoft.com/office/drawing/2014/main" id="{DC85004D-1D83-4764-96FA-8811CC17F779}"/>
+              </a:ext>
+            </a:extLst>
+          </p:cNvPr>
+          <p:cNvSpPr txBox="1"/>
+          <p:nvPr/>
+        </p:nvSpPr>
+        <p:spPr>
+          <a:xfrm>
+            <a:off x="1089293" y="4696895"/>
+            <a:ext cx="1157749" cy="276999"/>
+          </a:xfrm>
+          <a:prstGeom prst="rect">
+            <a:avLst/>
+          </a:prstGeom>
+          <a:noFill/>
+        </p:spPr>
+        <p:txBody>
+          <a:bodyPr wrap="square" rtlCol="0">
+            <a:spAutoFit/>
+          </a:bodyPr>
+          <a:lstStyle/>
+          <a:p>
+            <a:r>
+              <a:rPr lang="en-US" sz="1200" b="1" dirty="0"/>
+              <a:t>Length = Len</a:t>
+            </a:r>
+            <a:endParaRPr lang="en-IN" sz="1200" b="1" dirty="0"/>
+          </a:p>
+        </p:txBody>
+      </p:sp>
+      <p:sp>
+        <p:nvSpPr>
+          <p:cNvPr id="9" name="TextBox 8">
+            <a:extLst>
+              <a:ext uri="{FF2B5EF4-FFF2-40B4-BE49-F238E27FC236}">
+                <a16:creationId xmlns:a16="http://schemas.microsoft.com/office/drawing/2014/main" id="{2AA5BB09-8292-4338-86E6-91D885FFEA8A}"/>
+              </a:ext>
+            </a:extLst>
+          </p:cNvPr>
+          <p:cNvSpPr txBox="1"/>
+          <p:nvPr/>
+        </p:nvSpPr>
+        <p:spPr>
+          <a:xfrm>
+            <a:off x="3105388" y="4696895"/>
+            <a:ext cx="2440858" cy="276999"/>
+          </a:xfrm>
+          <a:prstGeom prst="rect">
+            <a:avLst/>
+          </a:prstGeom>
+          <a:noFill/>
+        </p:spPr>
+        <p:txBody>
+          <a:bodyPr wrap="square" rtlCol="0">
+            <a:spAutoFit/>
+          </a:bodyPr>
+          <a:lstStyle/>
+          <a:p>
+            <a:r>
+              <a:rPr lang="en-US" sz="1200" b="1" dirty="0"/>
+              <a:t>Length = 128 - (Len mod 128)</a:t>
+            </a:r>
+            <a:endParaRPr lang="en-IN" sz="1200" b="1" dirty="0"/>
+          </a:p>
+        </p:txBody>
+      </p:sp>
+      <p:sp>
+        <p:nvSpPr>
+          <p:cNvPr id="11" name="Arrow: Right 10">
+            <a:extLst>
+              <a:ext uri="{FF2B5EF4-FFF2-40B4-BE49-F238E27FC236}">
+                <a16:creationId xmlns:a16="http://schemas.microsoft.com/office/drawing/2014/main" id="{1B0066DA-F2F9-4458-9F11-4473B3CF5E21}"/>
+              </a:ext>
+            </a:extLst>
+          </p:cNvPr>
+          <p:cNvSpPr/>
+          <p:nvPr/>
+        </p:nvSpPr>
+        <p:spPr>
+          <a:xfrm>
+            <a:off x="5450382" y="3323933"/>
+            <a:ext cx="1054510" cy="153893"/>
+          </a:xfrm>
+          <a:prstGeom prst="rightArrow">
+            <a:avLst/>
+          </a:prstGeom>
+          <a:ln>
+            <a:solidFill>
+              <a:schemeClr val="accent5">
+                <a:lumMod val="75000"/>
+              </a:schemeClr>
+            </a:solidFill>
+          </a:ln>
+        </p:spPr>
+        <p:style>
+          <a:lnRef idx="2">
+            <a:schemeClr val="accent1">
+              <a:shade val="50000"/>
+            </a:schemeClr>
+          </a:lnRef>
+          <a:fillRef idx="1">
+            <a:schemeClr val="accent1"/>
+          </a:fillRef>
+          <a:effectRef idx="0">
+            <a:schemeClr val="accent1"/>
+          </a:effectRef>
+          <a:fontRef idx="minor">
+            <a:schemeClr val="lt1"/>
+          </a:fontRef>
+        </p:style>
+        <p:txBody>
+          <a:bodyPr rtlCol="0" anchor="ctr"/>
+          <a:lstStyle/>
+          <a:p>
+            <a:pPr algn="ctr"/>
+            <a:endParaRPr lang="en-IN"/>
+          </a:p>
+        </p:txBody>
+      </p:sp>
+      <p:sp>
+        <p:nvSpPr>
+          <p:cNvPr id="12" name="Rectangle: Rounded Corners 11">
+            <a:extLst>
+              <a:ext uri="{FF2B5EF4-FFF2-40B4-BE49-F238E27FC236}">
+                <a16:creationId xmlns:a16="http://schemas.microsoft.com/office/drawing/2014/main" id="{8EAD4CDC-B8A8-44E8-A323-088DE313ECE8}"/>
+              </a:ext>
+            </a:extLst>
+          </p:cNvPr>
+          <p:cNvSpPr/>
+          <p:nvPr/>
+        </p:nvSpPr>
+        <p:spPr>
+          <a:xfrm>
+            <a:off x="6586007" y="2928932"/>
+            <a:ext cx="2249129" cy="936523"/>
+          </a:xfrm>
+          <a:prstGeom prst="roundRect">
+            <a:avLst/>
+          </a:prstGeom>
+          <a:solidFill>
+            <a:schemeClr val="accent2">
+              <a:lumMod val="10000"/>
+              <a:lumOff val="90000"/>
+            </a:schemeClr>
+          </a:solidFill>
+          <a:ln>
+            <a:solidFill>
+              <a:schemeClr val="accent2">
+                <a:lumMod val="10000"/>
+                <a:lumOff val="90000"/>
+              </a:schemeClr>
+            </a:solidFill>
+          </a:ln>
+        </p:spPr>
+        <p:style>
+          <a:lnRef idx="2">
+            <a:schemeClr val="accent1">
+              <a:shade val="50000"/>
+            </a:schemeClr>
+          </a:lnRef>
+          <a:fillRef idx="1">
+            <a:schemeClr val="accent1"/>
+          </a:fillRef>
+          <a:effectRef idx="0">
+            <a:schemeClr val="accent1"/>
+          </a:effectRef>
+          <a:fontRef idx="minor">
+            <a:schemeClr val="lt1"/>
+          </a:fontRef>
+        </p:style>
+        <p:txBody>
+          <a:bodyPr rtlCol="0" anchor="ctr"/>
+          <a:lstStyle/>
+          <a:p>
+            <a:pPr algn="ctr"/>
+            <a:r>
+              <a:rPr lang="en-US" dirty="0">
+                <a:solidFill>
+                  <a:schemeClr val="accent5">
+                    <a:lumMod val="50000"/>
+                  </a:schemeClr>
+                </a:solidFill>
+              </a:rPr>
+              <a:t>The padded plaintext sent for encryption</a:t>
+            </a:r>
+            <a:endParaRPr lang="en-IN" dirty="0">
+              <a:solidFill>
+                <a:schemeClr val="accent5">
+                  <a:lumMod val="50000"/>
+                </a:schemeClr>
+              </a:solidFill>
+            </a:endParaRPr>
+          </a:p>
+        </p:txBody>
+      </p:sp>
+      <p:sp>
+        <p:nvSpPr>
+          <p:cNvPr id="13" name="Rectangle: Rounded Corners 12">
+            <a:extLst>
+              <a:ext uri="{FF2B5EF4-FFF2-40B4-BE49-F238E27FC236}">
+                <a16:creationId xmlns:a16="http://schemas.microsoft.com/office/drawing/2014/main" id="{A4FD5D3D-39B2-4614-89F9-CF681EB7F09C}"/>
+              </a:ext>
+            </a:extLst>
+          </p:cNvPr>
+          <p:cNvSpPr/>
+          <p:nvPr/>
+        </p:nvSpPr>
+        <p:spPr>
+          <a:xfrm>
+            <a:off x="358904" y="1151323"/>
+            <a:ext cx="3082413" cy="649904"/>
+          </a:xfrm>
+          <a:prstGeom prst="roundRect">
+            <a:avLst/>
+          </a:prstGeom>
+        </p:spPr>
+        <p:style>
+          <a:lnRef idx="2">
+            <a:schemeClr val="accent3">
+              <a:shade val="50000"/>
+            </a:schemeClr>
+          </a:lnRef>
+          <a:fillRef idx="1">
+            <a:schemeClr val="accent3"/>
+          </a:fillRef>
+          <a:effectRef idx="0">
+            <a:schemeClr val="accent3"/>
+          </a:effectRef>
+          <a:fontRef idx="minor">
+            <a:schemeClr val="lt1"/>
+          </a:fontRef>
+        </p:style>
+        <p:txBody>
+          <a:bodyPr rtlCol="0" anchor="ctr"/>
+          <a:lstStyle/>
+          <a:p>
+            <a:pPr algn="ctr"/>
+            <a:r>
+              <a:rPr lang="en-US" dirty="0"/>
+              <a:t>Plaintext(It may be in any language e.g. Mandarin, Hebrew etc.)</a:t>
+            </a:r>
+            <a:endParaRPr lang="en-IN" dirty="0"/>
+          </a:p>
+        </p:txBody>
+      </p:sp>
+      <p:sp>
+        <p:nvSpPr>
+          <p:cNvPr id="14" name="Arrow: Right 13">
+            <a:extLst>
+              <a:ext uri="{FF2B5EF4-FFF2-40B4-BE49-F238E27FC236}">
+                <a16:creationId xmlns:a16="http://schemas.microsoft.com/office/drawing/2014/main" id="{2CC1D05B-7BA8-404A-8EDD-916EFE8116F1}"/>
+              </a:ext>
+            </a:extLst>
+          </p:cNvPr>
+          <p:cNvSpPr/>
+          <p:nvPr/>
+        </p:nvSpPr>
+        <p:spPr>
+          <a:xfrm>
+            <a:off x="3611020" y="1169903"/>
+            <a:ext cx="1617283" cy="649904"/>
+          </a:xfrm>
+          <a:prstGeom prst="rightArrow">
+            <a:avLst/>
+          </a:prstGeom>
+          <a:solidFill>
+            <a:schemeClr val="accent5">
+              <a:lumMod val="20000"/>
+              <a:lumOff val="80000"/>
+            </a:schemeClr>
+          </a:solidFill>
+        </p:spPr>
+        <p:style>
+          <a:lnRef idx="2">
+            <a:schemeClr val="accent1">
+              <a:shade val="50000"/>
+            </a:schemeClr>
+          </a:lnRef>
+          <a:fillRef idx="1">
+            <a:schemeClr val="accent1"/>
+          </a:fillRef>
+          <a:effectRef idx="0">
+            <a:schemeClr val="accent1"/>
+          </a:effectRef>
+          <a:fontRef idx="minor">
+            <a:schemeClr val="lt1"/>
+          </a:fontRef>
+        </p:style>
+        <p:txBody>
+          <a:bodyPr rtlCol="0" anchor="ctr"/>
+          <a:lstStyle/>
+          <a:p>
+            <a:pPr algn="ctr"/>
+            <a:r>
+              <a:rPr lang="en-US" dirty="0"/>
+              <a:t>Encode</a:t>
+            </a:r>
+            <a:endParaRPr lang="en-IN" dirty="0"/>
+          </a:p>
+        </p:txBody>
+      </p:sp>
+      <p:sp>
+        <p:nvSpPr>
+          <p:cNvPr id="15" name="TextBox 14">
+            <a:extLst>
+              <a:ext uri="{FF2B5EF4-FFF2-40B4-BE49-F238E27FC236}">
+                <a16:creationId xmlns:a16="http://schemas.microsoft.com/office/drawing/2014/main" id="{B4CF764C-1C58-4CEB-8F48-6DB9DFD1BD37}"/>
+              </a:ext>
+            </a:extLst>
+          </p:cNvPr>
+          <p:cNvSpPr txBox="1"/>
+          <p:nvPr/>
+        </p:nvSpPr>
+        <p:spPr>
+          <a:xfrm>
+            <a:off x="335929" y="128469"/>
+            <a:ext cx="8445334" cy="523220"/>
+          </a:xfrm>
+          <a:prstGeom prst="rect">
+            <a:avLst/>
+          </a:prstGeom>
+          <a:noFill/>
+        </p:spPr>
+        <p:txBody>
+          <a:bodyPr wrap="square" rtlCol="0">
+            <a:spAutoFit/>
+          </a:bodyPr>
+          <a:lstStyle/>
+          <a:p>
+            <a:r>
+              <a:rPr lang="en-US" u="sng" dirty="0">
+                <a:solidFill>
+                  <a:schemeClr val="tx1"/>
+                </a:solidFill>
+              </a:rPr>
+              <a:t>Converting the plaintext to the Unicode string so that the encryption process will operate equa</a:t>
+            </a:r>
+            <a:r>
+              <a:rPr lang="en-US" u="sng" dirty="0"/>
+              <a:t>lly,</a:t>
+            </a:r>
+          </a:p>
+          <a:p>
+            <a:r>
+              <a:rPr lang="en-US" u="sng" dirty="0"/>
+              <a:t>We have used standard utf-8 Unicode based encoding and decoding pattern.</a:t>
+            </a:r>
+            <a:endParaRPr lang="en-IN" u="sng" dirty="0"/>
+          </a:p>
+        </p:txBody>
+      </p:sp>
+      <p:sp>
+        <p:nvSpPr>
+          <p:cNvPr id="16" name="Rectangle: Rounded Corners 15">
+            <a:extLst>
+              <a:ext uri="{FF2B5EF4-FFF2-40B4-BE49-F238E27FC236}">
+                <a16:creationId xmlns:a16="http://schemas.microsoft.com/office/drawing/2014/main" id="{ED12FBAD-F7B6-4604-86B4-4A6AF6D29AC5}"/>
+              </a:ext>
+            </a:extLst>
+          </p:cNvPr>
+          <p:cNvSpPr/>
+          <p:nvPr/>
+        </p:nvSpPr>
+        <p:spPr>
+          <a:xfrm>
+            <a:off x="5467172" y="1189031"/>
+            <a:ext cx="3082413" cy="649904"/>
+          </a:xfrm>
+          <a:prstGeom prst="roundRect">
+            <a:avLst/>
+          </a:prstGeom>
+        </p:spPr>
+        <p:style>
+          <a:lnRef idx="2">
+            <a:schemeClr val="accent3">
+              <a:shade val="50000"/>
+            </a:schemeClr>
+          </a:lnRef>
+          <a:fillRef idx="1">
+            <a:schemeClr val="accent3"/>
+          </a:fillRef>
+          <a:effectRef idx="0">
+            <a:schemeClr val="accent3"/>
+          </a:effectRef>
+          <a:fontRef idx="minor">
+            <a:schemeClr val="lt1"/>
+          </a:fontRef>
+        </p:style>
+        <p:txBody>
+          <a:bodyPr rtlCol="0" anchor="ctr"/>
+          <a:lstStyle/>
+          <a:p>
+            <a:pPr algn="ctr"/>
+            <a:r>
+              <a:rPr lang="en-US" dirty="0"/>
+              <a:t>Plaintext in universal Unicode characters</a:t>
+            </a:r>
+            <a:endParaRPr lang="en-IN" dirty="0"/>
+          </a:p>
+        </p:txBody>
+      </p:sp>
+    </p:spTree>
+    <p:extLst>
+      <p:ext uri="{BB962C8B-B14F-4D97-AF65-F5344CB8AC3E}">
+        <p14:creationId xmlns:p14="http://schemas.microsoft.com/office/powerpoint/2010/main" val="1880840325"/>
+      </p:ext>
+    </p:extLst>
+  </p:cSld>
+  <p:clrMapOvr>
+    <a:masterClrMapping/>
+  </p:clrMapOvr>
+</p:sld>
+</file>
+
+<file path=ppt/slides/slide5.xml><?xml version="1.0" encoding="utf-8"?>
+<p:sld xmlns:a="http://schemas.openxmlformats.org/drawingml/2006/main" xmlns:r="http://schemas.openxmlformats.org/officeDocument/2006/relationships" xmlns:p="http://schemas.openxmlformats.org/presentationml/2006/main">
+  <p:cSld>
     <p:bg>
       <p:bgPr>
         <a:solidFill>
-          <a:schemeClr val="tx2">
-            <a:lumMod val="90000"/>
+          <a:schemeClr val="accent3">
+            <a:lumMod val="20000"/>
+            <a:lumOff val="80000"/>
           </a:schemeClr>
         </a:solidFill>
         <a:effectLst/>
@@ -10981,7 +12078,7 @@
 </p:sld>
 </file>
 
-<file path=ppt/slides/slide5.xml><?xml version="1.0" encoding="utf-8"?>
+<file path=ppt/slides/slide6.xml><?xml version="1.0" encoding="utf-8"?>
 <p:sld xmlns:a="http://schemas.openxmlformats.org/drawingml/2006/main" xmlns:r="http://schemas.openxmlformats.org/officeDocument/2006/relationships" xmlns:p="http://schemas.openxmlformats.org/presentationml/2006/main">
   <p:cSld>
     <p:spTree>
@@ -11479,7 +12576,7 @@
 </p:sld>
 </file>
 
-<file path=ppt/slides/slide6.xml><?xml version="1.0" encoding="utf-8"?>
+<file path=ppt/slides/slide7.xml><?xml version="1.0" encoding="utf-8"?>
 <p:sld xmlns:a="http://schemas.openxmlformats.org/drawingml/2006/main" xmlns:r="http://schemas.openxmlformats.org/officeDocument/2006/relationships" xmlns:p="http://schemas.openxmlformats.org/presentationml/2006/main">
   <p:cSld>
     <p:spTree>
@@ -13101,7 +14198,7 @@
 </p:sld>
 </file>
 
-<file path=ppt/slides/slide7.xml><?xml version="1.0" encoding="utf-8"?>
+<file path=ppt/slides/slide8.xml><?xml version="1.0" encoding="utf-8"?>
 <p:sld xmlns:a="http://schemas.openxmlformats.org/drawingml/2006/main" xmlns:r="http://schemas.openxmlformats.org/officeDocument/2006/relationships" xmlns:p="http://schemas.openxmlformats.org/presentationml/2006/main">
   <p:cSld>
     <p:bg>
@@ -14758,7 +15855,7 @@
 </p:sld>
 </file>
 
-<file path=ppt/slides/slide8.xml><?xml version="1.0" encoding="utf-8"?>
+<file path=ppt/slides/slide9.xml><?xml version="1.0" encoding="utf-8"?>
 <p:sld xmlns:a="http://schemas.openxmlformats.org/drawingml/2006/main" xmlns:r="http://schemas.openxmlformats.org/officeDocument/2006/relationships" xmlns:p="http://schemas.openxmlformats.org/presentationml/2006/main">
   <p:cSld>
     <p:bg>
@@ -16119,298 +17216,6 @@
             <a:r>
               <a:rPr lang="en"/>
               <a:t>F0 and F1 are the result of function F</a:t>
-            </a:r>
-            <a:endParaRPr/>
-          </a:p>
-        </p:txBody>
-      </p:sp>
-    </p:spTree>
-  </p:cSld>
-  <p:clrMapOvr>
-    <a:masterClrMapping/>
-  </p:clrMapOvr>
-</p:sld>
-</file>
-
-<file path=ppt/slides/slide9.xml><?xml version="1.0" encoding="utf-8"?>
-<p:sld xmlns:a="http://schemas.openxmlformats.org/drawingml/2006/main" xmlns:r="http://schemas.openxmlformats.org/officeDocument/2006/relationships" xmlns:p="http://schemas.openxmlformats.org/presentationml/2006/main">
-  <p:cSld>
-    <p:bg>
-      <p:bgPr>
-        <a:solidFill>
-          <a:schemeClr val="tx2">
-            <a:lumMod val="90000"/>
-          </a:schemeClr>
-        </a:solidFill>
-        <a:effectLst/>
-      </p:bgPr>
-    </p:bg>
-    <p:spTree>
-      <p:nvGrpSpPr>
-        <p:cNvPr id="1" name="Shape 86"/>
-        <p:cNvGrpSpPr/>
-        <p:nvPr/>
-      </p:nvGrpSpPr>
-      <p:grpSpPr>
-        <a:xfrm>
-          <a:off x="0" y="0"/>
-          <a:ext cx="0" cy="0"/>
-          <a:chOff x="0" y="0"/>
-          <a:chExt cx="0" cy="0"/>
-        </a:xfrm>
-      </p:grpSpPr>
-      <p:sp>
-        <p:nvSpPr>
-          <p:cNvPr id="87" name="Google Shape;87;p14"/>
-          <p:cNvSpPr txBox="1"/>
-          <p:nvPr/>
-        </p:nvSpPr>
-        <p:spPr>
-          <a:xfrm>
-            <a:off x="150025" y="139300"/>
-            <a:ext cx="5357700" cy="400200"/>
-          </a:xfrm>
-          <a:prstGeom prst="rect">
-            <a:avLst/>
-          </a:prstGeom>
-          <a:noFill/>
-          <a:ln>
-            <a:noFill/>
-          </a:ln>
-        </p:spPr>
-        <p:txBody>
-          <a:bodyPr spcFirstLastPara="1" wrap="square" lIns="91425" tIns="91425" rIns="91425" bIns="91425" anchor="t" anchorCtr="0">
-            <a:spAutoFit/>
-          </a:bodyPr>
-          <a:lstStyle/>
-          <a:p>
-            <a:pPr marL="0" lvl="0" indent="0" algn="l" rtl="0">
-              <a:spcBef>
-                <a:spcPts val="0"/>
-              </a:spcBef>
-              <a:spcAft>
-                <a:spcPts val="0"/>
-              </a:spcAft>
-              <a:buNone/>
-            </a:pPr>
-            <a:r>
-              <a:rPr lang="en" u="sng"/>
-              <a:t>The methodology of the Error correcting codes:</a:t>
-            </a:r>
-            <a:endParaRPr u="sng"/>
-          </a:p>
-        </p:txBody>
-      </p:sp>
-      <p:sp>
-        <p:nvSpPr>
-          <p:cNvPr id="88" name="Google Shape;88;p14"/>
-          <p:cNvSpPr txBox="1"/>
-          <p:nvPr/>
-        </p:nvSpPr>
-        <p:spPr>
-          <a:xfrm>
-            <a:off x="267900" y="610800"/>
-            <a:ext cx="8679600" cy="2770500"/>
-          </a:xfrm>
-          <a:prstGeom prst="rect">
-            <a:avLst/>
-          </a:prstGeom>
-          <a:noFill/>
-          <a:ln>
-            <a:noFill/>
-          </a:ln>
-        </p:spPr>
-        <p:txBody>
-          <a:bodyPr spcFirstLastPara="1" wrap="square" lIns="91425" tIns="91425" rIns="91425" bIns="91425" anchor="t" anchorCtr="0">
-            <a:spAutoFit/>
-          </a:bodyPr>
-          <a:lstStyle/>
-          <a:p>
-            <a:pPr marL="0" lvl="0" indent="0" algn="l" rtl="0">
-              <a:spcBef>
-                <a:spcPts val="0"/>
-              </a:spcBef>
-              <a:spcAft>
-                <a:spcPts val="0"/>
-              </a:spcAft>
-              <a:buNone/>
-            </a:pPr>
-            <a:r>
-              <a:rPr lang="en"/>
-              <a:t>Let us suppose that we want to transmit a 3 bit data: “010”, but instead of sending this as it is, </a:t>
-            </a:r>
-            <a:endParaRPr/>
-          </a:p>
-          <a:p>
-            <a:pPr marL="0" lvl="0" indent="0" algn="l" rtl="0">
-              <a:spcBef>
-                <a:spcPts val="0"/>
-              </a:spcBef>
-              <a:spcAft>
-                <a:spcPts val="0"/>
-              </a:spcAft>
-              <a:buNone/>
-            </a:pPr>
-            <a:r>
-              <a:rPr lang="en"/>
-              <a:t>I will send “000 111 000” instead , such that if in future it gets polluted to be something like “010 110 001” , then we can retrieve the original data by taking maximum occurring bit from each of the chunk of the three.</a:t>
-            </a:r>
-            <a:endParaRPr/>
-          </a:p>
-          <a:p>
-            <a:pPr marL="0" lvl="0" indent="0" algn="l" rtl="0">
-              <a:spcBef>
-                <a:spcPts val="0"/>
-              </a:spcBef>
-              <a:spcAft>
-                <a:spcPts val="0"/>
-              </a:spcAft>
-              <a:buNone/>
-            </a:pPr>
-            <a:endParaRPr/>
-          </a:p>
-          <a:p>
-            <a:pPr marL="0" lvl="0" indent="0" algn="l" rtl="0">
-              <a:spcBef>
-                <a:spcPts val="0"/>
-              </a:spcBef>
-              <a:spcAft>
-                <a:spcPts val="0"/>
-              </a:spcAft>
-              <a:buNone/>
-            </a:pPr>
-            <a:r>
-              <a:rPr lang="en"/>
-              <a:t>Now we learn that if we have a bit pattern of length of “N” then we can convert it into a corresponding sequence of length of “M” such that M=cN, which will make the process of correction easier only on encryption and decryption side but the transmitted data will not be the same plaintext.</a:t>
-            </a:r>
-            <a:endParaRPr/>
-          </a:p>
-          <a:p>
-            <a:pPr marL="0" lvl="0" indent="0" algn="l" rtl="0">
-              <a:spcBef>
-                <a:spcPts val="0"/>
-              </a:spcBef>
-              <a:spcAft>
-                <a:spcPts val="0"/>
-              </a:spcAft>
-              <a:buNone/>
-            </a:pPr>
-            <a:endParaRPr/>
-          </a:p>
-          <a:p>
-            <a:pPr marL="0" lvl="0" indent="0" algn="l" rtl="0">
-              <a:spcBef>
-                <a:spcPts val="0"/>
-              </a:spcBef>
-              <a:spcAft>
-                <a:spcPts val="0"/>
-              </a:spcAft>
-              <a:buNone/>
-            </a:pPr>
-            <a:endParaRPr/>
-          </a:p>
-          <a:p>
-            <a:pPr marL="0" lvl="0" indent="0" algn="l" rtl="0">
-              <a:spcBef>
-                <a:spcPts val="0"/>
-              </a:spcBef>
-              <a:spcAft>
-                <a:spcPts val="0"/>
-              </a:spcAft>
-              <a:buNone/>
-            </a:pPr>
-            <a:r>
-              <a:rPr lang="en"/>
-              <a:t>Finally we have sequence to be sent as : “001”</a:t>
-            </a:r>
-            <a:br>
-              <a:rPr lang="en"/>
-            </a:br>
-            <a:r>
-              <a:rPr lang="en"/>
-              <a:t>I can convert them into either “000 000 111” or “010 001 110”, because both of them will be producing the same pattern when we will run selection based on majority of frequency.</a:t>
-            </a:r>
-            <a:endParaRPr/>
-          </a:p>
-        </p:txBody>
-      </p:sp>
-      <p:sp>
-        <p:nvSpPr>
-          <p:cNvPr id="89" name="Google Shape;89;p14"/>
-          <p:cNvSpPr txBox="1"/>
-          <p:nvPr/>
-        </p:nvSpPr>
-        <p:spPr>
-          <a:xfrm>
-            <a:off x="364325" y="3568300"/>
-            <a:ext cx="8390400" cy="1046700"/>
-          </a:xfrm>
-          <a:prstGeom prst="rect">
-            <a:avLst/>
-          </a:prstGeom>
-          <a:noFill/>
-          <a:ln>
-            <a:noFill/>
-          </a:ln>
-        </p:spPr>
-        <p:txBody>
-          <a:bodyPr spcFirstLastPara="1" wrap="square" lIns="91425" tIns="91425" rIns="91425" bIns="91425" anchor="t" anchorCtr="0">
-            <a:spAutoFit/>
-          </a:bodyPr>
-          <a:lstStyle/>
-          <a:p>
-            <a:pPr marL="0" lvl="0" indent="0" algn="l" rtl="0">
-              <a:spcBef>
-                <a:spcPts val="0"/>
-              </a:spcBef>
-              <a:spcAft>
-                <a:spcPts val="0"/>
-              </a:spcAft>
-              <a:buNone/>
-            </a:pPr>
-            <a:r>
-              <a:rPr lang="en"/>
-              <a:t>SO, we have used the </a:t>
-            </a:r>
-            <a:r>
-              <a:rPr lang="en">
-                <a:solidFill>
-                  <a:srgbClr val="980000"/>
-                </a:solidFill>
-              </a:rPr>
-              <a:t>Maximum Distance Separable(MDS)</a:t>
-            </a:r>
-            <a:r>
-              <a:rPr lang="en"/>
-              <a:t> </a:t>
-            </a:r>
-            <a:r>
-              <a:rPr lang="en">
-                <a:solidFill>
-                  <a:srgbClr val="980000"/>
-                </a:solidFill>
-              </a:rPr>
-              <a:t>matrix for modifying the original plaintext to new plaintext which will go for the further encryption process by linear transformation.</a:t>
-            </a:r>
-            <a:endParaRPr>
-              <a:solidFill>
-                <a:srgbClr val="980000"/>
-              </a:solidFill>
-            </a:endParaRPr>
-          </a:p>
-          <a:p>
-            <a:pPr marL="0" lvl="0" indent="0" algn="l" rtl="0">
-              <a:spcBef>
-                <a:spcPts val="0"/>
-              </a:spcBef>
-              <a:spcAft>
-                <a:spcPts val="0"/>
-              </a:spcAft>
-              <a:buNone/>
-            </a:pPr>
-            <a:r>
-              <a:rPr lang="en"/>
-              <a:t>MDS will corrupt the text but will keep the original information safe as the process of the maximum frequency method can extract the codes after the decryption process.</a:t>
             </a:r>
             <a:endParaRPr/>
           </a:p>

</xml_diff>

<commit_message>
fianlizing the changes for submission
</commit_message>
<xml_diff>
--- a/Final Year Project(PPT)(Group- CS41).pptx
+++ b/Final Year Project(PPT)(Group- CS41).pptx
@@ -6672,16 +6672,16 @@
               <a:t>        </a:t>
             </a:r>
             <a:r>
-              <a:rPr lang="en" sz="5000" dirty="0">
+              <a:rPr lang="en" sz="4000" dirty="0">
                 <a:solidFill>
                   <a:schemeClr val="accent5">
                     <a:lumMod val="50000"/>
                   </a:schemeClr>
                 </a:solidFill>
               </a:rPr>
-              <a:t>Quantum safe algorithm</a:t>
+              <a:t>Quantum safe cryptography</a:t>
             </a:r>
-            <a:endParaRPr sz="5000" dirty="0">
+            <a:endParaRPr sz="4000" dirty="0">
               <a:solidFill>
                 <a:schemeClr val="accent5">
                   <a:lumMod val="50000"/>

</xml_diff>

<commit_message>
Commiting the final format of latex report
</commit_message>
<xml_diff>
--- a/Final Year Project(PPT)(Group- CS41).pptx
+++ b/Final Year Project(PPT)(Group- CS41).pptx
@@ -6752,8 +6752,9 @@
     <p:bg>
       <p:bgPr>
         <a:solidFill>
-          <a:schemeClr val="tx2">
-            <a:lumMod val="90000"/>
+          <a:schemeClr val="accent2">
+            <a:lumMod val="10000"/>
+            <a:lumOff val="90000"/>
           </a:schemeClr>
         </a:solidFill>
         <a:effectLst/>
@@ -6850,10 +6851,10 @@
               <a:buNone/>
             </a:pPr>
             <a:r>
-              <a:rPr lang="en"/>
+              <a:rPr lang="en" dirty="0"/>
               <a:t>Let us suppose that we want to transmit a 3 bit data: “010”, but instead of sending this as it is, </a:t>
             </a:r>
-            <a:endParaRPr/>
+            <a:endParaRPr dirty="0"/>
           </a:p>
           <a:p>
             <a:pPr marL="0" lvl="0" indent="0" algn="l" rtl="0">
@@ -6866,10 +6867,10 @@
               <a:buNone/>
             </a:pPr>
             <a:r>
-              <a:rPr lang="en"/>
+              <a:rPr lang="en" dirty="0"/>
               <a:t>I will send “000 111 000” instead , such that if in future it gets polluted to be something like “010 110 001” , then we can retrieve the original data by taking maximum occurring bit from each of the chunk of the three.</a:t>
             </a:r>
-            <a:endParaRPr/>
+            <a:endParaRPr dirty="0"/>
           </a:p>
           <a:p>
             <a:pPr marL="0" lvl="0" indent="0" algn="l" rtl="0">
@@ -6881,7 +6882,7 @@
               </a:spcAft>
               <a:buNone/>
             </a:pPr>
-            <a:endParaRPr/>
+            <a:endParaRPr dirty="0"/>
           </a:p>
           <a:p>
             <a:pPr marL="0" lvl="0" indent="0" algn="l" rtl="0">
@@ -6894,10 +6895,10 @@
               <a:buNone/>
             </a:pPr>
             <a:r>
-              <a:rPr lang="en"/>
+              <a:rPr lang="en" dirty="0"/>
               <a:t>Now we learn that if we have a bit pattern of length of “N” then we can convert it into a corresponding sequence of length of “M” such that M=cN, which will make the process of correction easier only on encryption and decryption side but the transmitted data will not be the same plaintext.</a:t>
             </a:r>
-            <a:endParaRPr/>
+            <a:endParaRPr dirty="0"/>
           </a:p>
           <a:p>
             <a:pPr marL="0" lvl="0" indent="0" algn="l" rtl="0">
@@ -6909,7 +6910,7 @@
               </a:spcAft>
               <a:buNone/>
             </a:pPr>
-            <a:endParaRPr/>
+            <a:endParaRPr dirty="0"/>
           </a:p>
           <a:p>
             <a:pPr marL="0" lvl="0" indent="0" algn="l" rtl="0">
@@ -6921,7 +6922,7 @@
               </a:spcAft>
               <a:buNone/>
             </a:pPr>
-            <a:endParaRPr/>
+            <a:endParaRPr dirty="0"/>
           </a:p>
           <a:p>
             <a:pPr marL="0" lvl="0" indent="0" algn="l" rtl="0">
@@ -6934,17 +6935,17 @@
               <a:buNone/>
             </a:pPr>
             <a:r>
-              <a:rPr lang="en"/>
+              <a:rPr lang="en" dirty="0"/>
               <a:t>Finally we have sequence to be sent as : “001”</a:t>
             </a:r>
             <a:br>
-              <a:rPr lang="en"/>
+              <a:rPr lang="en" dirty="0"/>
             </a:br>
             <a:r>
-              <a:rPr lang="en"/>
+              <a:rPr lang="en" dirty="0"/>
               <a:t>I can convert them into either “000 000 111” or “010 001 110”, because both of them will be producing the same pattern when we will run selection based on majority of frequency.</a:t>
             </a:r>
-            <a:endParaRPr/>
+            <a:endParaRPr dirty="0"/>
           </a:p>
         </p:txBody>
       </p:sp>
@@ -9640,10 +9641,18 @@
           <a:p>
             <a:pPr algn="ctr"/>
             <a:r>
-              <a:rPr lang="en-US" dirty="0"/>
+              <a:rPr lang="en-US" dirty="0">
+                <a:solidFill>
+                  <a:schemeClr val="tx1"/>
+                </a:solidFill>
+              </a:rPr>
               <a:t>Encode</a:t>
             </a:r>
-            <a:endParaRPr lang="en-IN" dirty="0"/>
+            <a:endParaRPr lang="en-IN" dirty="0">
+              <a:solidFill>
+                <a:schemeClr val="tx1"/>
+              </a:solidFill>
+            </a:endParaRPr>
           </a:p>
         </p:txBody>
       </p:sp>

</xml_diff>